<commit_message>
Konzeptidee formuliert. Bilder erstellt
</commit_message>
<xml_diff>
--- a/Dokumente/Präsentationen/2019-01-24_DA_Feldkemper_Treffen_Krzywinski.pptx
+++ b/Dokumente/Präsentationen/2019-01-24_DA_Feldkemper_Treffen_Krzywinski.pptx
@@ -33,14 +33,14 @@
   <p:notesSz cx="6858000" cy="9144000"/>
   <p:embeddedFontLst>
     <p:embeddedFont>
-      <p:font typeface="Open Sans" panose="020B0604020202020204" charset="0"/>
+      <p:font typeface="Calibri" panose="020F0502020204030204" pitchFamily="34" charset="0"/>
       <p:regular r:id="rId21"/>
       <p:bold r:id="rId22"/>
       <p:italic r:id="rId23"/>
       <p:boldItalic r:id="rId24"/>
     </p:embeddedFont>
     <p:embeddedFont>
-      <p:font typeface="Calibri" panose="020F0502020204030204" pitchFamily="34" charset="0"/>
+      <p:font typeface="Open Sans" panose="020B0604020202020204" charset="0"/>
       <p:regular r:id="rId25"/>
       <p:bold r:id="rId26"/>
       <p:italic r:id="rId27"/>
@@ -273,7 +273,7 @@
           <a:p>
             <a:fld id="{C6AC6211-610F-44E5-BF19-D3CDF6EDD281}" type="datetimeFigureOut">
               <a:rPr lang="de-DE" smtClean="0"/>
-              <a:t>25.01.2019</a:t>
+              <a:t>01.02.2019</a:t>
             </a:fld>
             <a:endParaRPr lang="de-DE"/>
           </a:p>
@@ -439,7 +439,7 @@
           <a:p>
             <a:fld id="{347435D3-23A6-45D3-8DFA-7317DC1E7A64}" type="datetimeFigureOut">
               <a:rPr lang="de-DE" smtClean="0"/>
-              <a:t>25.01.2019</a:t>
+              <a:t>01.02.2019</a:t>
             </a:fld>
             <a:endParaRPr lang="de-DE"/>
           </a:p>
@@ -1686,7 +1686,7 @@
           <p:cNvPr id="15" name="Rechteck 14">
             <a:extLst>
               <a:ext uri="{FF2B5EF4-FFF2-40B4-BE49-F238E27FC236}">
-                <a16:creationId xmlns:a16="http://schemas.microsoft.com/office/drawing/2014/main" xmlns="" id="{F770C3AA-244C-A141-BC22-D074823F4293}"/>
+                <a16:creationId xmlns="" xmlns:a16="http://schemas.microsoft.com/office/drawing/2014/main" id="{F770C3AA-244C-A141-BC22-D074823F4293}"/>
               </a:ext>
             </a:extLst>
           </p:cNvPr>
@@ -1926,7 +1926,7 @@
           <p:cNvPr id="5" name="Grafik 4">
             <a:extLst>
               <a:ext uri="{FF2B5EF4-FFF2-40B4-BE49-F238E27FC236}">
-                <a16:creationId xmlns:a16="http://schemas.microsoft.com/office/drawing/2014/main" xmlns="" id="{C0F785FA-BB6E-6347-A8C6-9846216D4CBB}"/>
+                <a16:creationId xmlns="" xmlns:a16="http://schemas.microsoft.com/office/drawing/2014/main" id="{C0F785FA-BB6E-6347-A8C6-9846216D4CBB}"/>
               </a:ext>
             </a:extLst>
           </p:cNvPr>
@@ -2115,7 +2115,7 @@
           <p:cNvPr id="12" name="Grafik 11" hidden="1">
             <a:extLst>
               <a:ext uri="{FF2B5EF4-FFF2-40B4-BE49-F238E27FC236}">
-                <a16:creationId xmlns:a16="http://schemas.microsoft.com/office/drawing/2014/main" xmlns="" id="{CFC0D4A5-64CF-6D49-98B1-9FF6119E60EC}"/>
+                <a16:creationId xmlns="" xmlns:a16="http://schemas.microsoft.com/office/drawing/2014/main" id="{CFC0D4A5-64CF-6D49-98B1-9FF6119E60EC}"/>
               </a:ext>
             </a:extLst>
           </p:cNvPr>
@@ -2145,7 +2145,7 @@
           <p:cNvPr id="17" name="Grafik 16">
             <a:extLst>
               <a:ext uri="{FF2B5EF4-FFF2-40B4-BE49-F238E27FC236}">
-                <a16:creationId xmlns:a16="http://schemas.microsoft.com/office/drawing/2014/main" xmlns="" id="{22ECE872-F4EF-2A49-BA96-6065BC99D769}"/>
+                <a16:creationId xmlns="" xmlns:a16="http://schemas.microsoft.com/office/drawing/2014/main" id="{22ECE872-F4EF-2A49-BA96-6065BC99D769}"/>
               </a:ext>
             </a:extLst>
           </p:cNvPr>
@@ -2415,7 +2415,7 @@
           <p:cNvPr id="24" name="Bildplatzhalter 23">
             <a:extLst>
               <a:ext uri="{FF2B5EF4-FFF2-40B4-BE49-F238E27FC236}">
-                <a16:creationId xmlns:a16="http://schemas.microsoft.com/office/drawing/2014/main" xmlns="" id="{24A56C48-CA8D-D349-89CC-35C3A65DC4D5}"/>
+                <a16:creationId xmlns="" xmlns:a16="http://schemas.microsoft.com/office/drawing/2014/main" id="{24A56C48-CA8D-D349-89CC-35C3A65DC4D5}"/>
               </a:ext>
             </a:extLst>
           </p:cNvPr>
@@ -2729,7 +2729,7 @@
           <p:cNvPr id="6" name="Textplatzhalter 5">
             <a:extLst>
               <a:ext uri="{FF2B5EF4-FFF2-40B4-BE49-F238E27FC236}">
-                <a16:creationId xmlns:a16="http://schemas.microsoft.com/office/drawing/2014/main" xmlns="" id="{2E77FCEF-52F5-324B-A583-005ABCE0E622}"/>
+                <a16:creationId xmlns="" xmlns:a16="http://schemas.microsoft.com/office/drawing/2014/main" id="{2E77FCEF-52F5-324B-A583-005ABCE0E622}"/>
               </a:ext>
             </a:extLst>
           </p:cNvPr>
@@ -2767,7 +2767,7 @@
           <p:cNvPr id="13" name="Grafik 12">
             <a:extLst>
               <a:ext uri="{FF2B5EF4-FFF2-40B4-BE49-F238E27FC236}">
-                <a16:creationId xmlns:a16="http://schemas.microsoft.com/office/drawing/2014/main" xmlns="" id="{F84F96E3-FAED-E24A-9E01-BBA4824F0E34}"/>
+                <a16:creationId xmlns="" xmlns:a16="http://schemas.microsoft.com/office/drawing/2014/main" id="{F84F96E3-FAED-E24A-9E01-BBA4824F0E34}"/>
               </a:ext>
             </a:extLst>
           </p:cNvPr>
@@ -2938,7 +2938,7 @@
           <p:cNvPr id="6" name="Rechteck 5">
             <a:extLst>
               <a:ext uri="{FF2B5EF4-FFF2-40B4-BE49-F238E27FC236}">
-                <a16:creationId xmlns:a16="http://schemas.microsoft.com/office/drawing/2014/main" xmlns="" id="{2447D286-D9F9-E84F-9173-2C8D2D2068E1}"/>
+                <a16:creationId xmlns="" xmlns:a16="http://schemas.microsoft.com/office/drawing/2014/main" id="{2447D286-D9F9-E84F-9173-2C8D2D2068E1}"/>
               </a:ext>
             </a:extLst>
           </p:cNvPr>
@@ -3005,7 +3005,7 @@
           <p:cNvPr id="10" name="Grafik 9">
             <a:extLst>
               <a:ext uri="{FF2B5EF4-FFF2-40B4-BE49-F238E27FC236}">
-                <a16:creationId xmlns:a16="http://schemas.microsoft.com/office/drawing/2014/main" xmlns="" id="{E4DBCC79-CA26-C240-B119-9127A62CDBA8}"/>
+                <a16:creationId xmlns="" xmlns:a16="http://schemas.microsoft.com/office/drawing/2014/main" id="{E4DBCC79-CA26-C240-B119-9127A62CDBA8}"/>
               </a:ext>
             </a:extLst>
           </p:cNvPr>
@@ -3107,7 +3107,7 @@
           <p:cNvPr id="5" name="Rechteck 4">
             <a:extLst>
               <a:ext uri="{FF2B5EF4-FFF2-40B4-BE49-F238E27FC236}">
-                <a16:creationId xmlns:a16="http://schemas.microsoft.com/office/drawing/2014/main" xmlns="" id="{FD770378-5F2D-DE46-8D66-09007E946AD3}"/>
+                <a16:creationId xmlns="" xmlns:a16="http://schemas.microsoft.com/office/drawing/2014/main" id="{FD770378-5F2D-DE46-8D66-09007E946AD3}"/>
               </a:ext>
             </a:extLst>
           </p:cNvPr>
@@ -3171,7 +3171,7 @@
           <p:cNvPr id="4" name="Grafik 3">
             <a:extLst>
               <a:ext uri="{FF2B5EF4-FFF2-40B4-BE49-F238E27FC236}">
-                <a16:creationId xmlns:a16="http://schemas.microsoft.com/office/drawing/2014/main" xmlns="" id="{4FE30B28-5777-FC40-9C3F-81738D289A6A}"/>
+                <a16:creationId xmlns="" xmlns:a16="http://schemas.microsoft.com/office/drawing/2014/main" id="{4FE30B28-5777-FC40-9C3F-81738D289A6A}"/>
               </a:ext>
             </a:extLst>
           </p:cNvPr>
@@ -4316,7 +4316,7 @@
           <p:cNvPr id="13" name="Grafik 12">
             <a:extLst>
               <a:ext uri="{FF2B5EF4-FFF2-40B4-BE49-F238E27FC236}">
-                <a16:creationId xmlns:a16="http://schemas.microsoft.com/office/drawing/2014/main" xmlns="" id="{2DC3CACD-C7C8-274E-BCD4-043370996A48}"/>
+                <a16:creationId xmlns="" xmlns:a16="http://schemas.microsoft.com/office/drawing/2014/main" id="{2DC3CACD-C7C8-274E-BCD4-043370996A48}"/>
               </a:ext>
             </a:extLst>
           </p:cNvPr>
@@ -5027,7 +5027,7 @@
           <p:cNvPr id="8" name="Gruppieren 7">
             <a:extLst>
               <a:ext uri="{FF2B5EF4-FFF2-40B4-BE49-F238E27FC236}">
-                <a16:creationId xmlns:a16="http://schemas.microsoft.com/office/drawing/2014/main" xmlns="" id="{55DEAA25-08DE-234A-9F7E-6DA95517E4AB}"/>
+                <a16:creationId xmlns="" xmlns:a16="http://schemas.microsoft.com/office/drawing/2014/main" id="{55DEAA25-08DE-234A-9F7E-6DA95517E4AB}"/>
               </a:ext>
             </a:extLst>
           </p:cNvPr>
@@ -5047,7 +5047,7 @@
             <p:cNvPr id="9" name="Rechteck 8">
               <a:extLst>
                 <a:ext uri="{FF2B5EF4-FFF2-40B4-BE49-F238E27FC236}">
-                  <a16:creationId xmlns:a16="http://schemas.microsoft.com/office/drawing/2014/main" xmlns="" id="{CBE4218A-6735-2946-A3C0-E23809B7CEDF}"/>
+                  <a16:creationId xmlns="" xmlns:a16="http://schemas.microsoft.com/office/drawing/2014/main" id="{CBE4218A-6735-2946-A3C0-E23809B7CEDF}"/>
                 </a:ext>
               </a:extLst>
             </p:cNvPr>
@@ -5198,7 +5198,7 @@
             <p:cNvPr id="10" name="Rechteck 9">
               <a:extLst>
                 <a:ext uri="{FF2B5EF4-FFF2-40B4-BE49-F238E27FC236}">
-                  <a16:creationId xmlns:a16="http://schemas.microsoft.com/office/drawing/2014/main" xmlns="" id="{5ECE2600-E242-0A47-A437-E1A9C7F07343}"/>
+                  <a16:creationId xmlns="" xmlns:a16="http://schemas.microsoft.com/office/drawing/2014/main" id="{5ECE2600-E242-0A47-A437-E1A9C7F07343}"/>
                 </a:ext>
               </a:extLst>
             </p:cNvPr>
@@ -5265,7 +5265,7 @@
           <p:cNvPr id="11" name="Gruppieren 10">
             <a:extLst>
               <a:ext uri="{FF2B5EF4-FFF2-40B4-BE49-F238E27FC236}">
-                <a16:creationId xmlns:a16="http://schemas.microsoft.com/office/drawing/2014/main" xmlns="" id="{2A9CBD64-DABE-DB44-8CC9-7ED3D3F42599}"/>
+                <a16:creationId xmlns="" xmlns:a16="http://schemas.microsoft.com/office/drawing/2014/main" id="{2A9CBD64-DABE-DB44-8CC9-7ED3D3F42599}"/>
               </a:ext>
             </a:extLst>
           </p:cNvPr>
@@ -5285,7 +5285,7 @@
             <p:cNvPr id="12" name="Rechteck 11">
               <a:extLst>
                 <a:ext uri="{FF2B5EF4-FFF2-40B4-BE49-F238E27FC236}">
-                  <a16:creationId xmlns:a16="http://schemas.microsoft.com/office/drawing/2014/main" xmlns="" id="{880AB37D-6202-FE47-84F8-2DB9C99F0992}"/>
+                  <a16:creationId xmlns="" xmlns:a16="http://schemas.microsoft.com/office/drawing/2014/main" id="{880AB37D-6202-FE47-84F8-2DB9C99F0992}"/>
                 </a:ext>
               </a:extLst>
             </p:cNvPr>
@@ -5475,7 +5475,7 @@
             <p:cNvPr id="13" name="Rechteck 12">
               <a:extLst>
                 <a:ext uri="{FF2B5EF4-FFF2-40B4-BE49-F238E27FC236}">
-                  <a16:creationId xmlns:a16="http://schemas.microsoft.com/office/drawing/2014/main" xmlns="" id="{6E6D6DF1-8063-C749-A415-29613D3195D5}"/>
+                  <a16:creationId xmlns="" xmlns:a16="http://schemas.microsoft.com/office/drawing/2014/main" id="{6E6D6DF1-8063-C749-A415-29613D3195D5}"/>
                 </a:ext>
               </a:extLst>
             </p:cNvPr>
@@ -5572,7 +5572,7 @@
           <p:cNvPr id="2" name="Titel 1">
             <a:extLst>
               <a:ext uri="{FF2B5EF4-FFF2-40B4-BE49-F238E27FC236}">
-                <a16:creationId xmlns:a16="http://schemas.microsoft.com/office/drawing/2014/main" xmlns="" id="{0E63EF50-EEA4-0D49-A35C-C36F045D035E}"/>
+                <a16:creationId xmlns="" xmlns:a16="http://schemas.microsoft.com/office/drawing/2014/main" id="{0E63EF50-EEA4-0D49-A35C-C36F045D035E}"/>
               </a:ext>
             </a:extLst>
           </p:cNvPr>
@@ -5617,7 +5617,7 @@
           <p:cNvPr id="5" name="Gruppieren 4">
             <a:extLst>
               <a:ext uri="{FF2B5EF4-FFF2-40B4-BE49-F238E27FC236}">
-                <a16:creationId xmlns:a16="http://schemas.microsoft.com/office/drawing/2014/main" xmlns="" id="{82067C57-47CC-BC4A-911D-C058CB8E64C1}"/>
+                <a16:creationId xmlns="" xmlns:a16="http://schemas.microsoft.com/office/drawing/2014/main" id="{82067C57-47CC-BC4A-911D-C058CB8E64C1}"/>
               </a:ext>
             </a:extLst>
           </p:cNvPr>
@@ -5637,7 +5637,7 @@
             <p:cNvPr id="6" name="Rechteck 5">
               <a:extLst>
                 <a:ext uri="{FF2B5EF4-FFF2-40B4-BE49-F238E27FC236}">
-                  <a16:creationId xmlns:a16="http://schemas.microsoft.com/office/drawing/2014/main" xmlns="" id="{1F74AAB6-FEC2-E040-AE2F-389C01E41200}"/>
+                  <a16:creationId xmlns="" xmlns:a16="http://schemas.microsoft.com/office/drawing/2014/main" id="{1F74AAB6-FEC2-E040-AE2F-389C01E41200}"/>
                 </a:ext>
               </a:extLst>
             </p:cNvPr>
@@ -5765,7 +5765,7 @@
             <p:cNvPr id="7" name="Rechteck 6">
               <a:extLst>
                 <a:ext uri="{FF2B5EF4-FFF2-40B4-BE49-F238E27FC236}">
-                  <a16:creationId xmlns:a16="http://schemas.microsoft.com/office/drawing/2014/main" xmlns="" id="{D9A91609-F78E-9C45-BCA7-7DF954BC0A1A}"/>
+                  <a16:creationId xmlns="" xmlns:a16="http://schemas.microsoft.com/office/drawing/2014/main" id="{D9A91609-F78E-9C45-BCA7-7DF954BC0A1A}"/>
                 </a:ext>
               </a:extLst>
             </p:cNvPr>
@@ -5824,7 +5824,7 @@
           <p:cNvPr id="8" name="Gruppieren 7">
             <a:extLst>
               <a:ext uri="{FF2B5EF4-FFF2-40B4-BE49-F238E27FC236}">
-                <a16:creationId xmlns:a16="http://schemas.microsoft.com/office/drawing/2014/main" xmlns="" id="{64401E1E-557D-5D4F-AE09-187A0802411B}"/>
+                <a16:creationId xmlns="" xmlns:a16="http://schemas.microsoft.com/office/drawing/2014/main" id="{64401E1E-557D-5D4F-AE09-187A0802411B}"/>
               </a:ext>
             </a:extLst>
           </p:cNvPr>
@@ -5844,7 +5844,7 @@
             <p:cNvPr id="9" name="Rechteck 8">
               <a:extLst>
                 <a:ext uri="{FF2B5EF4-FFF2-40B4-BE49-F238E27FC236}">
-                  <a16:creationId xmlns:a16="http://schemas.microsoft.com/office/drawing/2014/main" xmlns="" id="{35A0EAB9-4039-6448-AC03-B60DE38901D0}"/>
+                  <a16:creationId xmlns="" xmlns:a16="http://schemas.microsoft.com/office/drawing/2014/main" id="{35A0EAB9-4039-6448-AC03-B60DE38901D0}"/>
                 </a:ext>
               </a:extLst>
             </p:cNvPr>
@@ -5928,7 +5928,7 @@
             <p:cNvPr id="10" name="Rechteck 9">
               <a:extLst>
                 <a:ext uri="{FF2B5EF4-FFF2-40B4-BE49-F238E27FC236}">
-                  <a16:creationId xmlns:a16="http://schemas.microsoft.com/office/drawing/2014/main" xmlns="" id="{FCCEA108-686B-BB4F-95FB-4BCE5EB529F1}"/>
+                  <a16:creationId xmlns="" xmlns:a16="http://schemas.microsoft.com/office/drawing/2014/main" id="{FCCEA108-686B-BB4F-95FB-4BCE5EB529F1}"/>
                 </a:ext>
               </a:extLst>
             </p:cNvPr>
@@ -5987,7 +5987,7 @@
           <p:cNvPr id="11" name="Rechteck 10">
             <a:extLst>
               <a:ext uri="{FF2B5EF4-FFF2-40B4-BE49-F238E27FC236}">
-                <a16:creationId xmlns:a16="http://schemas.microsoft.com/office/drawing/2014/main" xmlns="" id="{96BDAF81-30A4-1E4E-959F-95E9EB7F7C7A}"/>
+                <a16:creationId xmlns="" xmlns:a16="http://schemas.microsoft.com/office/drawing/2014/main" id="{96BDAF81-30A4-1E4E-959F-95E9EB7F7C7A}"/>
               </a:ext>
             </a:extLst>
           </p:cNvPr>
@@ -6054,7 +6054,7 @@
           <p:cNvPr id="12" name="Rechteck 11">
             <a:extLst>
               <a:ext uri="{FF2B5EF4-FFF2-40B4-BE49-F238E27FC236}">
-                <a16:creationId xmlns:a16="http://schemas.microsoft.com/office/drawing/2014/main" xmlns="" id="{E6C50A77-89BD-8744-8E4D-4BE35B73D833}"/>
+                <a16:creationId xmlns="" xmlns:a16="http://schemas.microsoft.com/office/drawing/2014/main" id="{E6C50A77-89BD-8744-8E4D-4BE35B73D833}"/>
               </a:ext>
             </a:extLst>
           </p:cNvPr>
@@ -6121,7 +6121,7 @@
           <p:cNvPr id="13" name="Gruppieren 12">
             <a:extLst>
               <a:ext uri="{FF2B5EF4-FFF2-40B4-BE49-F238E27FC236}">
-                <a16:creationId xmlns:a16="http://schemas.microsoft.com/office/drawing/2014/main" xmlns="" id="{5B6A8D9F-A9F8-264C-B489-24AFD5A8596D}"/>
+                <a16:creationId xmlns="" xmlns:a16="http://schemas.microsoft.com/office/drawing/2014/main" id="{5B6A8D9F-A9F8-264C-B489-24AFD5A8596D}"/>
               </a:ext>
             </a:extLst>
           </p:cNvPr>
@@ -6141,7 +6141,7 @@
             <p:cNvPr id="14" name="Rechteck 13">
               <a:extLst>
                 <a:ext uri="{FF2B5EF4-FFF2-40B4-BE49-F238E27FC236}">
-                  <a16:creationId xmlns:a16="http://schemas.microsoft.com/office/drawing/2014/main" xmlns="" id="{8766CB30-3942-9E46-8CAC-FC33876B35F3}"/>
+                  <a16:creationId xmlns="" xmlns:a16="http://schemas.microsoft.com/office/drawing/2014/main" id="{8766CB30-3942-9E46-8CAC-FC33876B35F3}"/>
                 </a:ext>
               </a:extLst>
             </p:cNvPr>
@@ -6225,7 +6225,7 @@
             <p:cNvPr id="15" name="Rechteck 14">
               <a:extLst>
                 <a:ext uri="{FF2B5EF4-FFF2-40B4-BE49-F238E27FC236}">
-                  <a16:creationId xmlns:a16="http://schemas.microsoft.com/office/drawing/2014/main" xmlns="" id="{79F41613-6C39-9547-8B51-B50E6A35E505}"/>
+                  <a16:creationId xmlns="" xmlns:a16="http://schemas.microsoft.com/office/drawing/2014/main" id="{79F41613-6C39-9547-8B51-B50E6A35E505}"/>
                 </a:ext>
               </a:extLst>
             </p:cNvPr>
@@ -6284,7 +6284,7 @@
           <p:cNvPr id="16" name="Gruppieren 15">
             <a:extLst>
               <a:ext uri="{FF2B5EF4-FFF2-40B4-BE49-F238E27FC236}">
-                <a16:creationId xmlns:a16="http://schemas.microsoft.com/office/drawing/2014/main" xmlns="" id="{3EAAE737-A1E8-BD49-A661-00C0D54A60DD}"/>
+                <a16:creationId xmlns="" xmlns:a16="http://schemas.microsoft.com/office/drawing/2014/main" id="{3EAAE737-A1E8-BD49-A661-00C0D54A60DD}"/>
               </a:ext>
             </a:extLst>
           </p:cNvPr>
@@ -6304,7 +6304,7 @@
             <p:cNvPr id="17" name="Rechteck 16">
               <a:extLst>
                 <a:ext uri="{FF2B5EF4-FFF2-40B4-BE49-F238E27FC236}">
-                  <a16:creationId xmlns:a16="http://schemas.microsoft.com/office/drawing/2014/main" xmlns="" id="{A12CF216-7A5B-B546-8D15-3FFD047539D4}"/>
+                  <a16:creationId xmlns="" xmlns:a16="http://schemas.microsoft.com/office/drawing/2014/main" id="{A12CF216-7A5B-B546-8D15-3FFD047539D4}"/>
                 </a:ext>
               </a:extLst>
             </p:cNvPr>
@@ -6402,7 +6402,7 @@
             <p:cNvPr id="18" name="Rechteck 17">
               <a:extLst>
                 <a:ext uri="{FF2B5EF4-FFF2-40B4-BE49-F238E27FC236}">
-                  <a16:creationId xmlns:a16="http://schemas.microsoft.com/office/drawing/2014/main" xmlns="" id="{91008A0C-F66B-104F-B3C9-118DB994F72D}"/>
+                  <a16:creationId xmlns="" xmlns:a16="http://schemas.microsoft.com/office/drawing/2014/main" id="{91008A0C-F66B-104F-B3C9-118DB994F72D}"/>
                 </a:ext>
               </a:extLst>
             </p:cNvPr>
@@ -6491,7 +6491,7 @@
           <p:cNvPr id="2" name="Titel 1">
             <a:extLst>
               <a:ext uri="{FF2B5EF4-FFF2-40B4-BE49-F238E27FC236}">
-                <a16:creationId xmlns:a16="http://schemas.microsoft.com/office/drawing/2014/main" xmlns="" id="{7BA8FE41-0B04-6748-9CA8-05F0AE81883B}"/>
+                <a16:creationId xmlns="" xmlns:a16="http://schemas.microsoft.com/office/drawing/2014/main" id="{7BA8FE41-0B04-6748-9CA8-05F0AE81883B}"/>
               </a:ext>
             </a:extLst>
           </p:cNvPr>
@@ -6519,7 +6519,7 @@
           <p:cNvPr id="12" name="Gruppieren 11">
             <a:extLst>
               <a:ext uri="{FF2B5EF4-FFF2-40B4-BE49-F238E27FC236}">
-                <a16:creationId xmlns:a16="http://schemas.microsoft.com/office/drawing/2014/main" xmlns="" id="{995F115A-CBCD-7A4D-8C0A-281259A5A3C1}"/>
+                <a16:creationId xmlns="" xmlns:a16="http://schemas.microsoft.com/office/drawing/2014/main" id="{995F115A-CBCD-7A4D-8C0A-281259A5A3C1}"/>
               </a:ext>
             </a:extLst>
           </p:cNvPr>
@@ -6539,7 +6539,7 @@
             <p:cNvPr id="4" name="Gruppieren 3">
               <a:extLst>
                 <a:ext uri="{FF2B5EF4-FFF2-40B4-BE49-F238E27FC236}">
-                  <a16:creationId xmlns:a16="http://schemas.microsoft.com/office/drawing/2014/main" xmlns="" id="{783A73D2-C025-644E-A194-3438D291D352}"/>
+                  <a16:creationId xmlns="" xmlns:a16="http://schemas.microsoft.com/office/drawing/2014/main" id="{783A73D2-C025-644E-A194-3438D291D352}"/>
                 </a:ext>
               </a:extLst>
             </p:cNvPr>
@@ -6559,7 +6559,7 @@
               <p:cNvPr id="5" name="Rechteck 4">
                 <a:extLst>
                   <a:ext uri="{FF2B5EF4-FFF2-40B4-BE49-F238E27FC236}">
-                    <a16:creationId xmlns:a16="http://schemas.microsoft.com/office/drawing/2014/main" xmlns="" id="{4F68B8E9-417E-0141-AE27-E298ED29929C}"/>
+                    <a16:creationId xmlns="" xmlns:a16="http://schemas.microsoft.com/office/drawing/2014/main" id="{4F68B8E9-417E-0141-AE27-E298ED29929C}"/>
                   </a:ext>
                 </a:extLst>
               </p:cNvPr>
@@ -6651,7 +6651,7 @@
               <p:cNvPr id="6" name="Rechteck 5">
                 <a:extLst>
                   <a:ext uri="{FF2B5EF4-FFF2-40B4-BE49-F238E27FC236}">
-                    <a16:creationId xmlns:a16="http://schemas.microsoft.com/office/drawing/2014/main" xmlns="" id="{B2717A64-B61E-B44C-B23D-CB509FB519CA}"/>
+                    <a16:creationId xmlns="" xmlns:a16="http://schemas.microsoft.com/office/drawing/2014/main" id="{B2717A64-B61E-B44C-B23D-CB509FB519CA}"/>
                   </a:ext>
                 </a:extLst>
               </p:cNvPr>
@@ -6710,7 +6710,7 @@
             <p:cNvPr id="7" name="Rechteck 6">
               <a:extLst>
                 <a:ext uri="{FF2B5EF4-FFF2-40B4-BE49-F238E27FC236}">
-                  <a16:creationId xmlns:a16="http://schemas.microsoft.com/office/drawing/2014/main" xmlns="" id="{6F92A16E-30FA-A34D-A87A-AD884881288C}"/>
+                  <a16:creationId xmlns="" xmlns:a16="http://schemas.microsoft.com/office/drawing/2014/main" id="{6F92A16E-30FA-A34D-A87A-AD884881288C}"/>
                 </a:ext>
               </a:extLst>
             </p:cNvPr>
@@ -6770,7 +6770,7 @@
           <p:cNvPr id="13" name="Gruppieren 12">
             <a:extLst>
               <a:ext uri="{FF2B5EF4-FFF2-40B4-BE49-F238E27FC236}">
-                <a16:creationId xmlns:a16="http://schemas.microsoft.com/office/drawing/2014/main" xmlns="" id="{214C6E04-BA76-3048-B247-843530C6F237}"/>
+                <a16:creationId xmlns="" xmlns:a16="http://schemas.microsoft.com/office/drawing/2014/main" id="{214C6E04-BA76-3048-B247-843530C6F237}"/>
               </a:ext>
             </a:extLst>
           </p:cNvPr>
@@ -6790,7 +6790,7 @@
             <p:cNvPr id="14" name="Gruppieren 13">
               <a:extLst>
                 <a:ext uri="{FF2B5EF4-FFF2-40B4-BE49-F238E27FC236}">
-                  <a16:creationId xmlns:a16="http://schemas.microsoft.com/office/drawing/2014/main" xmlns="" id="{CF154C31-9B1A-6844-82C6-BEC64AE64B76}"/>
+                  <a16:creationId xmlns="" xmlns:a16="http://schemas.microsoft.com/office/drawing/2014/main" id="{CF154C31-9B1A-6844-82C6-BEC64AE64B76}"/>
                 </a:ext>
               </a:extLst>
             </p:cNvPr>
@@ -6810,7 +6810,7 @@
               <p:cNvPr id="16" name="Rechteck 15">
                 <a:extLst>
                   <a:ext uri="{FF2B5EF4-FFF2-40B4-BE49-F238E27FC236}">
-                    <a16:creationId xmlns:a16="http://schemas.microsoft.com/office/drawing/2014/main" xmlns="" id="{5D41E86D-96E1-F64F-B645-811FEF9C3566}"/>
+                    <a16:creationId xmlns="" xmlns:a16="http://schemas.microsoft.com/office/drawing/2014/main" id="{5D41E86D-96E1-F64F-B645-811FEF9C3566}"/>
                   </a:ext>
                 </a:extLst>
               </p:cNvPr>
@@ -6941,7 +6941,7 @@
               <p:cNvPr id="17" name="Rechteck 16">
                 <a:extLst>
                   <a:ext uri="{FF2B5EF4-FFF2-40B4-BE49-F238E27FC236}">
-                    <a16:creationId xmlns:a16="http://schemas.microsoft.com/office/drawing/2014/main" xmlns="" id="{829E215D-25C5-FE42-A84B-E10BE5590901}"/>
+                    <a16:creationId xmlns="" xmlns:a16="http://schemas.microsoft.com/office/drawing/2014/main" id="{829E215D-25C5-FE42-A84B-E10BE5590901}"/>
                   </a:ext>
                 </a:extLst>
               </p:cNvPr>
@@ -7000,7 +7000,7 @@
             <p:cNvPr id="15" name="Rechteck 14">
               <a:extLst>
                 <a:ext uri="{FF2B5EF4-FFF2-40B4-BE49-F238E27FC236}">
-                  <a16:creationId xmlns:a16="http://schemas.microsoft.com/office/drawing/2014/main" xmlns="" id="{3D7F9058-E672-2A4D-9BB1-013BCCC5ACE0}"/>
+                  <a16:creationId xmlns="" xmlns:a16="http://schemas.microsoft.com/office/drawing/2014/main" id="{3D7F9058-E672-2A4D-9BB1-013BCCC5ACE0}"/>
                 </a:ext>
               </a:extLst>
             </p:cNvPr>
@@ -7060,7 +7060,7 @@
           <p:cNvPr id="18" name="Gruppieren 17">
             <a:extLst>
               <a:ext uri="{FF2B5EF4-FFF2-40B4-BE49-F238E27FC236}">
-                <a16:creationId xmlns:a16="http://schemas.microsoft.com/office/drawing/2014/main" xmlns="" id="{76C873CF-9A61-9B4A-9A7F-7A0A6A11ECCC}"/>
+                <a16:creationId xmlns="" xmlns:a16="http://schemas.microsoft.com/office/drawing/2014/main" id="{76C873CF-9A61-9B4A-9A7F-7A0A6A11ECCC}"/>
               </a:ext>
             </a:extLst>
           </p:cNvPr>
@@ -7080,7 +7080,7 @@
             <p:cNvPr id="19" name="Gruppieren 18">
               <a:extLst>
                 <a:ext uri="{FF2B5EF4-FFF2-40B4-BE49-F238E27FC236}">
-                  <a16:creationId xmlns:a16="http://schemas.microsoft.com/office/drawing/2014/main" xmlns="" id="{02621200-51DD-6A4C-86C6-6B2A72D512E2}"/>
+                  <a16:creationId xmlns="" xmlns:a16="http://schemas.microsoft.com/office/drawing/2014/main" id="{02621200-51DD-6A4C-86C6-6B2A72D512E2}"/>
                 </a:ext>
               </a:extLst>
             </p:cNvPr>
@@ -7100,7 +7100,7 @@
               <p:cNvPr id="21" name="Rechteck 20">
                 <a:extLst>
                   <a:ext uri="{FF2B5EF4-FFF2-40B4-BE49-F238E27FC236}">
-                    <a16:creationId xmlns:a16="http://schemas.microsoft.com/office/drawing/2014/main" xmlns="" id="{ED0E09EA-1DC6-1249-841E-901E17F3D0B6}"/>
+                    <a16:creationId xmlns="" xmlns:a16="http://schemas.microsoft.com/office/drawing/2014/main" id="{ED0E09EA-1DC6-1249-841E-901E17F3D0B6}"/>
                   </a:ext>
                 </a:extLst>
               </p:cNvPr>
@@ -7189,7 +7189,7 @@
               <p:cNvPr id="22" name="Rechteck 21">
                 <a:extLst>
                   <a:ext uri="{FF2B5EF4-FFF2-40B4-BE49-F238E27FC236}">
-                    <a16:creationId xmlns:a16="http://schemas.microsoft.com/office/drawing/2014/main" xmlns="" id="{753356B5-7EB8-3F4A-96E1-8FF10B332D06}"/>
+                    <a16:creationId xmlns="" xmlns:a16="http://schemas.microsoft.com/office/drawing/2014/main" id="{753356B5-7EB8-3F4A-96E1-8FF10B332D06}"/>
                   </a:ext>
                 </a:extLst>
               </p:cNvPr>
@@ -7248,7 +7248,7 @@
             <p:cNvPr id="20" name="Rechteck 19">
               <a:extLst>
                 <a:ext uri="{FF2B5EF4-FFF2-40B4-BE49-F238E27FC236}">
-                  <a16:creationId xmlns:a16="http://schemas.microsoft.com/office/drawing/2014/main" xmlns="" id="{63DF4C62-579D-3249-9CFF-878DBD32F80A}"/>
+                  <a16:creationId xmlns="" xmlns:a16="http://schemas.microsoft.com/office/drawing/2014/main" id="{63DF4C62-579D-3249-9CFF-878DBD32F80A}"/>
                 </a:ext>
               </a:extLst>
             </p:cNvPr>
@@ -7308,7 +7308,7 @@
           <p:cNvPr id="23" name="Gruppieren 22">
             <a:extLst>
               <a:ext uri="{FF2B5EF4-FFF2-40B4-BE49-F238E27FC236}">
-                <a16:creationId xmlns:a16="http://schemas.microsoft.com/office/drawing/2014/main" xmlns="" id="{8E929239-873F-A040-A4FF-CF41E574A33B}"/>
+                <a16:creationId xmlns="" xmlns:a16="http://schemas.microsoft.com/office/drawing/2014/main" id="{8E929239-873F-A040-A4FF-CF41E574A33B}"/>
               </a:ext>
             </a:extLst>
           </p:cNvPr>
@@ -7328,7 +7328,7 @@
             <p:cNvPr id="24" name="Gruppieren 23">
               <a:extLst>
                 <a:ext uri="{FF2B5EF4-FFF2-40B4-BE49-F238E27FC236}">
-                  <a16:creationId xmlns:a16="http://schemas.microsoft.com/office/drawing/2014/main" xmlns="" id="{F47E6093-9AA6-8F4B-B80B-776943FCB73D}"/>
+                  <a16:creationId xmlns="" xmlns:a16="http://schemas.microsoft.com/office/drawing/2014/main" id="{F47E6093-9AA6-8F4B-B80B-776943FCB73D}"/>
                 </a:ext>
               </a:extLst>
             </p:cNvPr>
@@ -7348,7 +7348,7 @@
               <p:cNvPr id="26" name="Rechteck 25">
                 <a:extLst>
                   <a:ext uri="{FF2B5EF4-FFF2-40B4-BE49-F238E27FC236}">
-                    <a16:creationId xmlns:a16="http://schemas.microsoft.com/office/drawing/2014/main" xmlns="" id="{4059FEBC-2EFF-ED47-98FF-010C8401FADA}"/>
+                    <a16:creationId xmlns="" xmlns:a16="http://schemas.microsoft.com/office/drawing/2014/main" id="{4059FEBC-2EFF-ED47-98FF-010C8401FADA}"/>
                   </a:ext>
                 </a:extLst>
               </p:cNvPr>
@@ -7437,7 +7437,7 @@
               <p:cNvPr id="27" name="Rechteck 26">
                 <a:extLst>
                   <a:ext uri="{FF2B5EF4-FFF2-40B4-BE49-F238E27FC236}">
-                    <a16:creationId xmlns:a16="http://schemas.microsoft.com/office/drawing/2014/main" xmlns="" id="{A6C74FE9-D83D-2346-A400-58BA4229E830}"/>
+                    <a16:creationId xmlns="" xmlns:a16="http://schemas.microsoft.com/office/drawing/2014/main" id="{A6C74FE9-D83D-2346-A400-58BA4229E830}"/>
                   </a:ext>
                 </a:extLst>
               </p:cNvPr>
@@ -7496,7 +7496,7 @@
             <p:cNvPr id="25" name="Rechteck 24">
               <a:extLst>
                 <a:ext uri="{FF2B5EF4-FFF2-40B4-BE49-F238E27FC236}">
-                  <a16:creationId xmlns:a16="http://schemas.microsoft.com/office/drawing/2014/main" xmlns="" id="{1EDE063D-852E-324C-A77E-EFB1A1CCD783}"/>
+                  <a16:creationId xmlns="" xmlns:a16="http://schemas.microsoft.com/office/drawing/2014/main" id="{1EDE063D-852E-324C-A77E-EFB1A1CCD783}"/>
                 </a:ext>
               </a:extLst>
             </p:cNvPr>
@@ -7556,7 +7556,7 @@
           <p:cNvPr id="28" name="Gruppieren 27">
             <a:extLst>
               <a:ext uri="{FF2B5EF4-FFF2-40B4-BE49-F238E27FC236}">
-                <a16:creationId xmlns:a16="http://schemas.microsoft.com/office/drawing/2014/main" xmlns="" id="{076AA3C9-476D-4D45-B8BE-E0951E23CBCF}"/>
+                <a16:creationId xmlns="" xmlns:a16="http://schemas.microsoft.com/office/drawing/2014/main" id="{076AA3C9-476D-4D45-B8BE-E0951E23CBCF}"/>
               </a:ext>
             </a:extLst>
           </p:cNvPr>
@@ -7576,7 +7576,7 @@
             <p:cNvPr id="29" name="Gruppieren 28">
               <a:extLst>
                 <a:ext uri="{FF2B5EF4-FFF2-40B4-BE49-F238E27FC236}">
-                  <a16:creationId xmlns:a16="http://schemas.microsoft.com/office/drawing/2014/main" xmlns="" id="{B404C1CC-6DF7-B648-9CCB-5E2E9AFEB672}"/>
+                  <a16:creationId xmlns="" xmlns:a16="http://schemas.microsoft.com/office/drawing/2014/main" id="{B404C1CC-6DF7-B648-9CCB-5E2E9AFEB672}"/>
                 </a:ext>
               </a:extLst>
             </p:cNvPr>
@@ -7596,7 +7596,7 @@
               <p:cNvPr id="31" name="Rechteck 30">
                 <a:extLst>
                   <a:ext uri="{FF2B5EF4-FFF2-40B4-BE49-F238E27FC236}">
-                    <a16:creationId xmlns:a16="http://schemas.microsoft.com/office/drawing/2014/main" xmlns="" id="{4BDB37D7-D054-A942-8D6D-F9B2EF0F9FF6}"/>
+                    <a16:creationId xmlns="" xmlns:a16="http://schemas.microsoft.com/office/drawing/2014/main" id="{4BDB37D7-D054-A942-8D6D-F9B2EF0F9FF6}"/>
                   </a:ext>
                 </a:extLst>
               </p:cNvPr>
@@ -7660,7 +7660,7 @@
               <p:cNvPr id="32" name="Rechteck 31">
                 <a:extLst>
                   <a:ext uri="{FF2B5EF4-FFF2-40B4-BE49-F238E27FC236}">
-                    <a16:creationId xmlns:a16="http://schemas.microsoft.com/office/drawing/2014/main" xmlns="" id="{3A6CCD76-DF2E-A745-8BA8-2A2DA3CA1050}"/>
+                    <a16:creationId xmlns="" xmlns:a16="http://schemas.microsoft.com/office/drawing/2014/main" id="{3A6CCD76-DF2E-A745-8BA8-2A2DA3CA1050}"/>
                   </a:ext>
                 </a:extLst>
               </p:cNvPr>
@@ -7719,7 +7719,7 @@
             <p:cNvPr id="30" name="Rechteck 29">
               <a:extLst>
                 <a:ext uri="{FF2B5EF4-FFF2-40B4-BE49-F238E27FC236}">
-                  <a16:creationId xmlns:a16="http://schemas.microsoft.com/office/drawing/2014/main" xmlns="" id="{117072ED-37EF-E943-B866-F06DD4235CB3}"/>
+                  <a16:creationId xmlns="" xmlns:a16="http://schemas.microsoft.com/office/drawing/2014/main" id="{117072ED-37EF-E943-B866-F06DD4235CB3}"/>
                 </a:ext>
               </a:extLst>
             </p:cNvPr>
@@ -7809,7 +7809,7 @@
           <p:cNvPr id="2" name="Titel 1">
             <a:extLst>
               <a:ext uri="{FF2B5EF4-FFF2-40B4-BE49-F238E27FC236}">
-                <a16:creationId xmlns:a16="http://schemas.microsoft.com/office/drawing/2014/main" xmlns="" id="{486C50CA-1F3A-EF43-9380-876C137AD8EC}"/>
+                <a16:creationId xmlns="" xmlns:a16="http://schemas.microsoft.com/office/drawing/2014/main" id="{486C50CA-1F3A-EF43-9380-876C137AD8EC}"/>
               </a:ext>
             </a:extLst>
           </p:cNvPr>
@@ -7837,7 +7837,7 @@
           <p:cNvPr id="3" name="Inhaltsplatzhalter 2">
             <a:extLst>
               <a:ext uri="{FF2B5EF4-FFF2-40B4-BE49-F238E27FC236}">
-                <a16:creationId xmlns:a16="http://schemas.microsoft.com/office/drawing/2014/main" xmlns="" id="{ABD8A889-EFEB-F24E-8415-CFB9A520769E}"/>
+                <a16:creationId xmlns="" xmlns:a16="http://schemas.microsoft.com/office/drawing/2014/main" id="{ABD8A889-EFEB-F24E-8415-CFB9A520769E}"/>
               </a:ext>
             </a:extLst>
           </p:cNvPr>
@@ -11785,7 +11785,7 @@
           <p:cNvPr id="12" name="Gruppieren 11">
             <a:extLst>
               <a:ext uri="{FF2B5EF4-FFF2-40B4-BE49-F238E27FC236}">
-                <a16:creationId xmlns:a16="http://schemas.microsoft.com/office/drawing/2014/main" xmlns="" id="{EA0A8815-E75B-6046-B394-2A918B180A1D}"/>
+                <a16:creationId xmlns="" xmlns:a16="http://schemas.microsoft.com/office/drawing/2014/main" id="{EA0A8815-E75B-6046-B394-2A918B180A1D}"/>
               </a:ext>
             </a:extLst>
           </p:cNvPr>
@@ -11805,7 +11805,7 @@
             <p:cNvPr id="13" name="Rechteck 12">
               <a:extLst>
                 <a:ext uri="{FF2B5EF4-FFF2-40B4-BE49-F238E27FC236}">
-                  <a16:creationId xmlns:a16="http://schemas.microsoft.com/office/drawing/2014/main" xmlns="" id="{C6DACD2C-9288-2743-8000-2D2B960374D2}"/>
+                  <a16:creationId xmlns="" xmlns:a16="http://schemas.microsoft.com/office/drawing/2014/main" id="{C6DACD2C-9288-2743-8000-2D2B960374D2}"/>
                 </a:ext>
               </a:extLst>
             </p:cNvPr>
@@ -11897,7 +11897,7 @@
             <p:cNvPr id="14" name="Rechteck 13">
               <a:extLst>
                 <a:ext uri="{FF2B5EF4-FFF2-40B4-BE49-F238E27FC236}">
-                  <a16:creationId xmlns:a16="http://schemas.microsoft.com/office/drawing/2014/main" xmlns="" id="{8A961849-3F67-574C-9B6D-E3BC3038B489}"/>
+                  <a16:creationId xmlns="" xmlns:a16="http://schemas.microsoft.com/office/drawing/2014/main" id="{8A961849-3F67-574C-9B6D-E3BC3038B489}"/>
                 </a:ext>
               </a:extLst>
             </p:cNvPr>
@@ -11956,7 +11956,7 @@
           <p:cNvPr id="15" name="Gruppieren 14">
             <a:extLst>
               <a:ext uri="{FF2B5EF4-FFF2-40B4-BE49-F238E27FC236}">
-                <a16:creationId xmlns:a16="http://schemas.microsoft.com/office/drawing/2014/main" xmlns="" id="{A88F0E40-A3C2-8A49-B01C-D43BDE29765D}"/>
+                <a16:creationId xmlns="" xmlns:a16="http://schemas.microsoft.com/office/drawing/2014/main" id="{A88F0E40-A3C2-8A49-B01C-D43BDE29765D}"/>
               </a:ext>
             </a:extLst>
           </p:cNvPr>
@@ -11976,7 +11976,7 @@
             <p:cNvPr id="16" name="Rechteck 15">
               <a:extLst>
                 <a:ext uri="{FF2B5EF4-FFF2-40B4-BE49-F238E27FC236}">
-                  <a16:creationId xmlns:a16="http://schemas.microsoft.com/office/drawing/2014/main" xmlns="" id="{18E7CC15-3520-4B45-A599-D8A2FCD6071C}"/>
+                  <a16:creationId xmlns="" xmlns:a16="http://schemas.microsoft.com/office/drawing/2014/main" id="{18E7CC15-3520-4B45-A599-D8A2FCD6071C}"/>
                 </a:ext>
               </a:extLst>
             </p:cNvPr>
@@ -12171,7 +12171,7 @@
             <p:cNvPr id="17" name="Rechteck 16">
               <a:extLst>
                 <a:ext uri="{FF2B5EF4-FFF2-40B4-BE49-F238E27FC236}">
-                  <a16:creationId xmlns:a16="http://schemas.microsoft.com/office/drawing/2014/main" xmlns="" id="{9CA4E624-C249-DD44-95E5-805EF9DA78B4}"/>
+                  <a16:creationId xmlns="" xmlns:a16="http://schemas.microsoft.com/office/drawing/2014/main" id="{9CA4E624-C249-DD44-95E5-805EF9DA78B4}"/>
                 </a:ext>
               </a:extLst>
             </p:cNvPr>
@@ -12230,7 +12230,7 @@
           <p:cNvPr id="18" name="Gruppieren 17">
             <a:extLst>
               <a:ext uri="{FF2B5EF4-FFF2-40B4-BE49-F238E27FC236}">
-                <a16:creationId xmlns:a16="http://schemas.microsoft.com/office/drawing/2014/main" xmlns="" id="{14C33807-8E01-ED45-97CC-799667FE8E29}"/>
+                <a16:creationId xmlns="" xmlns:a16="http://schemas.microsoft.com/office/drawing/2014/main" id="{14C33807-8E01-ED45-97CC-799667FE8E29}"/>
               </a:ext>
             </a:extLst>
           </p:cNvPr>
@@ -12250,7 +12250,7 @@
             <p:cNvPr id="19" name="Rechteck 18">
               <a:extLst>
                 <a:ext uri="{FF2B5EF4-FFF2-40B4-BE49-F238E27FC236}">
-                  <a16:creationId xmlns:a16="http://schemas.microsoft.com/office/drawing/2014/main" xmlns="" id="{ADE0619D-3F85-424E-9F9E-D202B0D54706}"/>
+                  <a16:creationId xmlns="" xmlns:a16="http://schemas.microsoft.com/office/drawing/2014/main" id="{ADE0619D-3F85-424E-9F9E-D202B0D54706}"/>
                 </a:ext>
               </a:extLst>
             </p:cNvPr>
@@ -12443,7 +12443,7 @@
             <p:cNvPr id="20" name="Rechteck 19">
               <a:extLst>
                 <a:ext uri="{FF2B5EF4-FFF2-40B4-BE49-F238E27FC236}">
-                  <a16:creationId xmlns:a16="http://schemas.microsoft.com/office/drawing/2014/main" xmlns="" id="{C56BD12A-0269-3F42-B860-ADC924159D2D}"/>
+                  <a16:creationId xmlns="" xmlns:a16="http://schemas.microsoft.com/office/drawing/2014/main" id="{C56BD12A-0269-3F42-B860-ADC924159D2D}"/>
                 </a:ext>
               </a:extLst>
             </p:cNvPr>
@@ -13733,7 +13733,7 @@
             <p:cNvPr id="24" name="Rechteck 23">
               <a:extLst>
                 <a:ext uri="{FF2B5EF4-FFF2-40B4-BE49-F238E27FC236}">
-                  <a16:creationId xmlns:a16="http://schemas.microsoft.com/office/drawing/2014/main" xmlns="" id="{FCCEA108-686B-BB4F-95FB-4BCE5EB529F1}"/>
+                  <a16:creationId xmlns="" xmlns:a16="http://schemas.microsoft.com/office/drawing/2014/main" id="{FCCEA108-686B-BB4F-95FB-4BCE5EB529F1}"/>
                 </a:ext>
               </a:extLst>
             </p:cNvPr>
@@ -13797,7 +13797,7 @@
           <p:cNvPr id="25" name="Rechteck 24">
             <a:extLst>
               <a:ext uri="{FF2B5EF4-FFF2-40B4-BE49-F238E27FC236}">
-                <a16:creationId xmlns:a16="http://schemas.microsoft.com/office/drawing/2014/main" xmlns="" id="{FCCEA108-686B-BB4F-95FB-4BCE5EB529F1}"/>
+                <a16:creationId xmlns="" xmlns:a16="http://schemas.microsoft.com/office/drawing/2014/main" id="{FCCEA108-686B-BB4F-95FB-4BCE5EB529F1}"/>
               </a:ext>
             </a:extLst>
           </p:cNvPr>
@@ -13845,15 +13845,7 @@
                   <a:schemeClr val="accent4"/>
                 </a:solidFill>
               </a:rPr>
-              <a:t>Altes </a:t>
-            </a:r>
-            <a:r>
-              <a:rPr lang="de-DE" b="1" dirty="0" smtClean="0">
-                <a:solidFill>
-                  <a:schemeClr val="accent4"/>
-                </a:solidFill>
-              </a:rPr>
-              <a:t>Modul</a:t>
+              <a:t>Altes Modul</a:t>
             </a:r>
             <a:endParaRPr lang="de-DE" b="1" dirty="0">
               <a:solidFill>
@@ -13868,7 +13860,7 @@
           <p:cNvPr id="26" name="Rechteck 25">
             <a:extLst>
               <a:ext uri="{FF2B5EF4-FFF2-40B4-BE49-F238E27FC236}">
-                <a16:creationId xmlns:a16="http://schemas.microsoft.com/office/drawing/2014/main" xmlns="" id="{FCCEA108-686B-BB4F-95FB-4BCE5EB529F1}"/>
+                <a16:creationId xmlns="" xmlns:a16="http://schemas.microsoft.com/office/drawing/2014/main" id="{FCCEA108-686B-BB4F-95FB-4BCE5EB529F1}"/>
               </a:ext>
             </a:extLst>
           </p:cNvPr>
@@ -13984,7 +13976,7 @@
           <p:cNvPr id="4" name="Gruppieren 3">
             <a:extLst>
               <a:ext uri="{FF2B5EF4-FFF2-40B4-BE49-F238E27FC236}">
-                <a16:creationId xmlns:a16="http://schemas.microsoft.com/office/drawing/2014/main" xmlns="" id="{64401E1E-557D-5D4F-AE09-187A0802411B}"/>
+                <a16:creationId xmlns="" xmlns:a16="http://schemas.microsoft.com/office/drawing/2014/main" id="{64401E1E-557D-5D4F-AE09-187A0802411B}"/>
               </a:ext>
             </a:extLst>
           </p:cNvPr>
@@ -13994,9 +13986,9 @@
         <p:grpSpPr>
           <a:xfrm>
             <a:off x="874711" y="1199304"/>
-            <a:ext cx="3326899" cy="3812073"/>
+            <a:ext cx="3204000" cy="3812073"/>
             <a:chOff x="1780030" y="1414270"/>
-            <a:chExt cx="3326899" cy="3812073"/>
+            <a:chExt cx="3204000" cy="3812073"/>
           </a:xfrm>
         </p:grpSpPr>
         <p:sp>
@@ -14004,7 +13996,7 @@
             <p:cNvPr id="5" name="Rechteck 4">
               <a:extLst>
                 <a:ext uri="{FF2B5EF4-FFF2-40B4-BE49-F238E27FC236}">
-                  <a16:creationId xmlns:a16="http://schemas.microsoft.com/office/drawing/2014/main" xmlns="" id="{35A0EAB9-4039-6448-AC03-B60DE38901D0}"/>
+                  <a16:creationId xmlns="" xmlns:a16="http://schemas.microsoft.com/office/drawing/2014/main" id="{35A0EAB9-4039-6448-AC03-B60DE38901D0}"/>
                 </a:ext>
               </a:extLst>
             </p:cNvPr>
@@ -14014,7 +14006,7 @@
           <p:spPr>
             <a:xfrm>
               <a:off x="1780030" y="1583286"/>
-              <a:ext cx="3326899" cy="3643057"/>
+              <a:ext cx="3204000" cy="3643057"/>
             </a:xfrm>
             <a:prstGeom prst="rect">
               <a:avLst/>
@@ -14166,7 +14158,7 @@
             <p:cNvPr id="6" name="Rechteck 5">
               <a:extLst>
                 <a:ext uri="{FF2B5EF4-FFF2-40B4-BE49-F238E27FC236}">
-                  <a16:creationId xmlns:a16="http://schemas.microsoft.com/office/drawing/2014/main" xmlns="" id="{FCCEA108-686B-BB4F-95FB-4BCE5EB529F1}"/>
+                  <a16:creationId xmlns="" xmlns:a16="http://schemas.microsoft.com/office/drawing/2014/main" id="{FCCEA108-686B-BB4F-95FB-4BCE5EB529F1}"/>
                 </a:ext>
               </a:extLst>
             </p:cNvPr>
@@ -14230,7 +14222,7 @@
           <p:cNvPr id="7" name="Gruppieren 6">
             <a:extLst>
               <a:ext uri="{FF2B5EF4-FFF2-40B4-BE49-F238E27FC236}">
-                <a16:creationId xmlns:a16="http://schemas.microsoft.com/office/drawing/2014/main" xmlns="" id="{64401E1E-557D-5D4F-AE09-187A0802411B}"/>
+                <a16:creationId xmlns="" xmlns:a16="http://schemas.microsoft.com/office/drawing/2014/main" id="{64401E1E-557D-5D4F-AE09-187A0802411B}"/>
               </a:ext>
             </a:extLst>
           </p:cNvPr>
@@ -14239,8 +14231,8 @@
         </p:nvGrpSpPr>
         <p:grpSpPr>
           <a:xfrm>
-            <a:off x="8229600" y="1199304"/>
-            <a:ext cx="3225799" cy="3812073"/>
+            <a:off x="8229599" y="1199304"/>
+            <a:ext cx="3204000" cy="3812073"/>
             <a:chOff x="1742234" y="1414270"/>
             <a:chExt cx="3225799" cy="3812073"/>
           </a:xfrm>
@@ -14250,7 +14242,7 @@
             <p:cNvPr id="8" name="Rechteck 7">
               <a:extLst>
                 <a:ext uri="{FF2B5EF4-FFF2-40B4-BE49-F238E27FC236}">
-                  <a16:creationId xmlns:a16="http://schemas.microsoft.com/office/drawing/2014/main" xmlns="" id="{35A0EAB9-4039-6448-AC03-B60DE38901D0}"/>
+                  <a16:creationId xmlns="" xmlns:a16="http://schemas.microsoft.com/office/drawing/2014/main" id="{35A0EAB9-4039-6448-AC03-B60DE38901D0}"/>
                 </a:ext>
               </a:extLst>
             </p:cNvPr>
@@ -14386,7 +14378,7 @@
             <p:cNvPr id="9" name="Rechteck 8">
               <a:extLst>
                 <a:ext uri="{FF2B5EF4-FFF2-40B4-BE49-F238E27FC236}">
-                  <a16:creationId xmlns:a16="http://schemas.microsoft.com/office/drawing/2014/main" xmlns="" id="{FCCEA108-686B-BB4F-95FB-4BCE5EB529F1}"/>
+                  <a16:creationId xmlns="" xmlns:a16="http://schemas.microsoft.com/office/drawing/2014/main" id="{FCCEA108-686B-BB4F-95FB-4BCE5EB529F1}"/>
                 </a:ext>
               </a:extLst>
             </p:cNvPr>
@@ -14450,7 +14442,7 @@
           <p:cNvPr id="10" name="Rechteck 9">
             <a:extLst>
               <a:ext uri="{FF2B5EF4-FFF2-40B4-BE49-F238E27FC236}">
-                <a16:creationId xmlns:a16="http://schemas.microsoft.com/office/drawing/2014/main" xmlns="" id="{FCCEA108-686B-BB4F-95FB-4BCE5EB529F1}"/>
+                <a16:creationId xmlns="" xmlns:a16="http://schemas.microsoft.com/office/drawing/2014/main" id="{FCCEA108-686B-BB4F-95FB-4BCE5EB529F1}"/>
               </a:ext>
             </a:extLst>
           </p:cNvPr>
@@ -14551,7 +14543,7 @@
           <p:cNvPr id="13" name="Gruppieren 12">
             <a:extLst>
               <a:ext uri="{FF2B5EF4-FFF2-40B4-BE49-F238E27FC236}">
-                <a16:creationId xmlns:a16="http://schemas.microsoft.com/office/drawing/2014/main" xmlns="" id="{64401E1E-557D-5D4F-AE09-187A0802411B}"/>
+                <a16:creationId xmlns="" xmlns:a16="http://schemas.microsoft.com/office/drawing/2014/main" id="{64401E1E-557D-5D4F-AE09-187A0802411B}"/>
               </a:ext>
             </a:extLst>
           </p:cNvPr>
@@ -14560,10 +14552,10 @@
         </p:nvGrpSpPr>
         <p:grpSpPr>
           <a:xfrm>
-            <a:off x="4621604" y="1199304"/>
-            <a:ext cx="3188002" cy="3812073"/>
+            <a:off x="4552155" y="1199304"/>
+            <a:ext cx="3204000" cy="3812073"/>
             <a:chOff x="1780031" y="1414270"/>
-            <a:chExt cx="3188002" cy="3812073"/>
+            <a:chExt cx="3204000" cy="3812073"/>
           </a:xfrm>
         </p:grpSpPr>
         <p:sp>
@@ -14571,7 +14563,7 @@
             <p:cNvPr id="14" name="Rechteck 13">
               <a:extLst>
                 <a:ext uri="{FF2B5EF4-FFF2-40B4-BE49-F238E27FC236}">
-                  <a16:creationId xmlns:a16="http://schemas.microsoft.com/office/drawing/2014/main" xmlns="" id="{35A0EAB9-4039-6448-AC03-B60DE38901D0}"/>
+                  <a16:creationId xmlns="" xmlns:a16="http://schemas.microsoft.com/office/drawing/2014/main" id="{35A0EAB9-4039-6448-AC03-B60DE38901D0}"/>
                 </a:ext>
               </a:extLst>
             </p:cNvPr>
@@ -14581,7 +14573,7 @@
           <p:spPr>
             <a:xfrm>
               <a:off x="1780031" y="1583287"/>
-              <a:ext cx="3188002" cy="3643056"/>
+              <a:ext cx="3204000" cy="3643056"/>
             </a:xfrm>
             <a:prstGeom prst="rect">
               <a:avLst/>
@@ -14665,10 +14657,6 @@
               </a:endParaRPr>
             </a:p>
             <a:p>
-              <a:pPr marL="285750" indent="-285750">
-                <a:buFont typeface="Arial" panose="020B0604020202020204" pitchFamily="34" charset="0"/>
-                <a:buChar char="•"/>
-              </a:pPr>
               <a:endParaRPr lang="de-DE" dirty="0" smtClean="0">
                 <a:solidFill>
                   <a:schemeClr val="tx1"/>
@@ -14701,7 +14689,7 @@
             <p:cNvPr id="15" name="Rechteck 14">
               <a:extLst>
                 <a:ext uri="{FF2B5EF4-FFF2-40B4-BE49-F238E27FC236}">
-                  <a16:creationId xmlns:a16="http://schemas.microsoft.com/office/drawing/2014/main" xmlns="" id="{FCCEA108-686B-BB4F-95FB-4BCE5EB529F1}"/>
+                  <a16:creationId xmlns="" xmlns:a16="http://schemas.microsoft.com/office/drawing/2014/main" id="{FCCEA108-686B-BB4F-95FB-4BCE5EB529F1}"/>
                 </a:ext>
               </a:extLst>
             </p:cNvPr>
@@ -14765,7 +14753,7 @@
           <p:cNvPr id="16" name="Rechteck 15">
             <a:extLst>
               <a:ext uri="{FF2B5EF4-FFF2-40B4-BE49-F238E27FC236}">
-                <a16:creationId xmlns:a16="http://schemas.microsoft.com/office/drawing/2014/main" xmlns="" id="{FCCEA108-686B-BB4F-95FB-4BCE5EB529F1}"/>
+                <a16:creationId xmlns="" xmlns:a16="http://schemas.microsoft.com/office/drawing/2014/main" id="{FCCEA108-686B-BB4F-95FB-4BCE5EB529F1}"/>
               </a:ext>
             </a:extLst>
           </p:cNvPr>
@@ -14774,7 +14762,7 @@
         </p:nvSpPr>
         <p:spPr>
           <a:xfrm>
-            <a:off x="4982074" y="5180391"/>
+            <a:off x="4966716" y="5180391"/>
             <a:ext cx="2309977" cy="338027"/>
           </a:xfrm>
           <a:prstGeom prst="rect">
@@ -14828,7 +14816,7 @@
           <p:cNvPr id="18" name="Rechteck 17">
             <a:extLst>
               <a:ext uri="{FF2B5EF4-FFF2-40B4-BE49-F238E27FC236}">
-                <a16:creationId xmlns:a16="http://schemas.microsoft.com/office/drawing/2014/main" xmlns="" id="{FCCEA108-686B-BB4F-95FB-4BCE5EB529F1}"/>
+                <a16:creationId xmlns="" xmlns:a16="http://schemas.microsoft.com/office/drawing/2014/main" id="{FCCEA108-686B-BB4F-95FB-4BCE5EB529F1}"/>
               </a:ext>
             </a:extLst>
           </p:cNvPr>
@@ -14837,7 +14825,7 @@
         </p:nvSpPr>
         <p:spPr>
           <a:xfrm>
-            <a:off x="8590069" y="5163777"/>
+            <a:off x="8650477" y="5163777"/>
             <a:ext cx="2865330" cy="577266"/>
           </a:xfrm>
           <a:prstGeom prst="rect">
@@ -14894,7 +14882,7 @@
         </p:nvCxnSpPr>
         <p:spPr>
           <a:xfrm rot="16200000" flipH="1">
-            <a:off x="4706053" y="5073385"/>
+            <a:off x="4690696" y="5073385"/>
             <a:ext cx="338028" cy="214012"/>
           </a:xfrm>
           <a:prstGeom prst="bentConnector2">
@@ -14930,7 +14918,7 @@
         </p:nvCxnSpPr>
         <p:spPr>
           <a:xfrm rot="16200000" flipH="1">
-            <a:off x="8314049" y="5073385"/>
+            <a:off x="8374457" y="5073385"/>
             <a:ext cx="338028" cy="214012"/>
           </a:xfrm>
           <a:prstGeom prst="bentConnector2">
@@ -15021,7 +15009,7 @@
           <p:cNvPr id="4" name="Gruppieren 3">
             <a:extLst>
               <a:ext uri="{FF2B5EF4-FFF2-40B4-BE49-F238E27FC236}">
-                <a16:creationId xmlns:a16="http://schemas.microsoft.com/office/drawing/2014/main" xmlns="" id="{64401E1E-557D-5D4F-AE09-187A0802411B}"/>
+                <a16:creationId xmlns="" xmlns:a16="http://schemas.microsoft.com/office/drawing/2014/main" id="{64401E1E-557D-5D4F-AE09-187A0802411B}"/>
               </a:ext>
             </a:extLst>
           </p:cNvPr>
@@ -15031,9 +15019,9 @@
         <p:grpSpPr>
           <a:xfrm>
             <a:off x="874712" y="1227061"/>
-            <a:ext cx="3558392" cy="3333365"/>
+            <a:ext cx="3558392" cy="3564857"/>
             <a:chOff x="1780031" y="1414270"/>
-            <a:chExt cx="3558392" cy="3333365"/>
+            <a:chExt cx="3558392" cy="3564857"/>
           </a:xfrm>
         </p:grpSpPr>
         <p:sp>
@@ -15041,7 +15029,7 @@
             <p:cNvPr id="5" name="Rechteck 4">
               <a:extLst>
                 <a:ext uri="{FF2B5EF4-FFF2-40B4-BE49-F238E27FC236}">
-                  <a16:creationId xmlns:a16="http://schemas.microsoft.com/office/drawing/2014/main" xmlns="" id="{35A0EAB9-4039-6448-AC03-B60DE38901D0}"/>
+                  <a16:creationId xmlns="" xmlns:a16="http://schemas.microsoft.com/office/drawing/2014/main" id="{35A0EAB9-4039-6448-AC03-B60DE38901D0}"/>
                 </a:ext>
               </a:extLst>
             </p:cNvPr>
@@ -15050,8 +15038,8 @@
           </p:nvSpPr>
           <p:spPr>
             <a:xfrm>
-              <a:off x="1780031" y="1583287"/>
-              <a:ext cx="3558392" cy="3164348"/>
+              <a:off x="1780031" y="1583286"/>
+              <a:ext cx="3558392" cy="3395841"/>
             </a:xfrm>
             <a:prstGeom prst="rect">
               <a:avLst/>
@@ -15097,7 +15085,7 @@
             <p:cNvPr id="6" name="Rechteck 5">
               <a:extLst>
                 <a:ext uri="{FF2B5EF4-FFF2-40B4-BE49-F238E27FC236}">
-                  <a16:creationId xmlns:a16="http://schemas.microsoft.com/office/drawing/2014/main" xmlns="" id="{FCCEA108-686B-BB4F-95FB-4BCE5EB529F1}"/>
+                  <a16:creationId xmlns="" xmlns:a16="http://schemas.microsoft.com/office/drawing/2014/main" id="{FCCEA108-686B-BB4F-95FB-4BCE5EB529F1}"/>
                 </a:ext>
               </a:extLst>
             </p:cNvPr>
@@ -15164,7 +15152,7 @@
         </p:nvSpPr>
         <p:spPr>
           <a:xfrm>
-            <a:off x="1071718" y="2731625"/>
+            <a:off x="1060025" y="3148326"/>
             <a:ext cx="3187765" cy="567160"/>
           </a:xfrm>
           <a:prstGeom prst="rect">
@@ -15224,7 +15212,7 @@
         </p:nvSpPr>
         <p:spPr>
           <a:xfrm>
-            <a:off x="1078237" y="3692324"/>
+            <a:off x="1063285" y="4021334"/>
             <a:ext cx="3181246" cy="567160"/>
           </a:xfrm>
           <a:prstGeom prst="rect">
@@ -15284,8 +15272,8 @@
         </p:nvSpPr>
         <p:spPr>
           <a:xfrm>
-            <a:off x="1078237" y="1766392"/>
-            <a:ext cx="3181245" cy="567160"/>
+            <a:off x="1066545" y="1788314"/>
+            <a:ext cx="3181245" cy="971068"/>
           </a:xfrm>
           <a:prstGeom prst="rect">
             <a:avLst/>
@@ -15347,8 +15335,8 @@
         </p:nvCxnSpPr>
         <p:spPr>
           <a:xfrm flipH="1">
-            <a:off x="2665601" y="2333552"/>
-            <a:ext cx="3259" cy="398073"/>
+            <a:off x="2653908" y="2759382"/>
+            <a:ext cx="3260" cy="388944"/>
           </a:xfrm>
           <a:prstGeom prst="straightConnector1">
             <a:avLst/>
@@ -15386,8 +15374,8 @@
         </p:nvCxnSpPr>
         <p:spPr>
           <a:xfrm>
-            <a:off x="2665601" y="3298785"/>
-            <a:ext cx="3259" cy="393539"/>
+            <a:off x="2653908" y="3715486"/>
+            <a:ext cx="0" cy="305848"/>
           </a:xfrm>
           <a:prstGeom prst="straightConnector1">
             <a:avLst/>
@@ -15433,7 +15421,7 @@
             <p:cNvPr id="7" name="Gruppieren 6">
               <a:extLst>
                 <a:ext uri="{FF2B5EF4-FFF2-40B4-BE49-F238E27FC236}">
-                  <a16:creationId xmlns:a16="http://schemas.microsoft.com/office/drawing/2014/main" xmlns="" id="{64401E1E-557D-5D4F-AE09-187A0802411B}"/>
+                  <a16:creationId xmlns="" xmlns:a16="http://schemas.microsoft.com/office/drawing/2014/main" id="{64401E1E-557D-5D4F-AE09-187A0802411B}"/>
                 </a:ext>
               </a:extLst>
             </p:cNvPr>
@@ -15453,7 +15441,7 @@
               <p:cNvPr id="8" name="Rechteck 7">
                 <a:extLst>
                   <a:ext uri="{FF2B5EF4-FFF2-40B4-BE49-F238E27FC236}">
-                    <a16:creationId xmlns:a16="http://schemas.microsoft.com/office/drawing/2014/main" xmlns="" id="{35A0EAB9-4039-6448-AC03-B60DE38901D0}"/>
+                    <a16:creationId xmlns="" xmlns:a16="http://schemas.microsoft.com/office/drawing/2014/main" id="{35A0EAB9-4039-6448-AC03-B60DE38901D0}"/>
                   </a:ext>
                 </a:extLst>
               </p:cNvPr>
@@ -15509,7 +15497,7 @@
               <p:cNvPr id="9" name="Rechteck 8">
                 <a:extLst>
                   <a:ext uri="{FF2B5EF4-FFF2-40B4-BE49-F238E27FC236}">
-                    <a16:creationId xmlns:a16="http://schemas.microsoft.com/office/drawing/2014/main" xmlns="" id="{FCCEA108-686B-BB4F-95FB-4BCE5EB529F1}"/>
+                    <a16:creationId xmlns="" xmlns:a16="http://schemas.microsoft.com/office/drawing/2014/main" id="{FCCEA108-686B-BB4F-95FB-4BCE5EB529F1}"/>
                   </a:ext>
                 </a:extLst>
               </p:cNvPr>
@@ -15518,8 +15506,8 @@
             </p:nvSpPr>
             <p:spPr>
               <a:xfrm>
-                <a:off x="1977038" y="1414270"/>
-                <a:ext cx="1808448" cy="338027"/>
+                <a:off x="1977037" y="1414270"/>
+                <a:ext cx="1997569" cy="338027"/>
               </a:xfrm>
               <a:prstGeom prst="rect">
                 <a:avLst/>
@@ -15557,7 +15545,7 @@
                       <a:schemeClr val="accent4"/>
                     </a:solidFill>
                   </a:rPr>
-                  <a:t>Problemlösung</a:t>
+                  <a:t>Problemlösungen</a:t>
                 </a:r>
                 <a:endParaRPr lang="de-DE" b="1" dirty="0">
                   <a:solidFill>
@@ -15831,19 +15819,20 @@
         <p:nvCxnSpPr>
           <p:cNvPr id="28" name="Gewinkelte Verbindung 27"/>
           <p:cNvCxnSpPr>
-            <a:stCxn id="5" idx="2"/>
+            <a:stCxn id="11" idx="2"/>
+            <a:endCxn id="17" idx="1"/>
           </p:cNvCxnSpPr>
           <p:nvPr/>
         </p:nvCxnSpPr>
         <p:spPr>
           <a:xfrm rot="5400000" flipH="1" flipV="1">
-            <a:off x="2661711" y="2067780"/>
-            <a:ext cx="2484843" cy="2500450"/>
+            <a:off x="2829181" y="2100045"/>
+            <a:ext cx="2313175" cy="2663723"/>
           </a:xfrm>
           <a:prstGeom prst="bentConnector4">
             <a:avLst>
-              <a:gd name="adj1" fmla="val -22582"/>
-              <a:gd name="adj2" fmla="val 85578"/>
+              <a:gd name="adj1" fmla="val -25395"/>
+              <a:gd name="adj2" fmla="val 79857"/>
             </a:avLst>
           </a:prstGeom>
           <a:ln w="9525">
@@ -15993,7 +15982,7 @@
           <p:cNvPr id="49" name="Gruppieren 48">
             <a:extLst>
               <a:ext uri="{FF2B5EF4-FFF2-40B4-BE49-F238E27FC236}">
-                <a16:creationId xmlns:a16="http://schemas.microsoft.com/office/drawing/2014/main" xmlns="" id="{64401E1E-557D-5D4F-AE09-187A0802411B}"/>
+                <a16:creationId xmlns="" xmlns:a16="http://schemas.microsoft.com/office/drawing/2014/main" id="{64401E1E-557D-5D4F-AE09-187A0802411B}"/>
               </a:ext>
             </a:extLst>
           </p:cNvPr>
@@ -16002,10 +15991,10 @@
         </p:nvGrpSpPr>
         <p:grpSpPr>
           <a:xfrm>
-            <a:off x="9400268" y="1227061"/>
-            <a:ext cx="1984637" cy="3125021"/>
+            <a:off x="9366536" y="1227061"/>
+            <a:ext cx="2018369" cy="3564857"/>
             <a:chOff x="1780031" y="1414270"/>
-            <a:chExt cx="1984637" cy="3125021"/>
+            <a:chExt cx="1984637" cy="3564857"/>
           </a:xfrm>
         </p:grpSpPr>
         <p:sp>
@@ -16013,7 +16002,7 @@
             <p:cNvPr id="50" name="Rechteck 49">
               <a:extLst>
                 <a:ext uri="{FF2B5EF4-FFF2-40B4-BE49-F238E27FC236}">
-                  <a16:creationId xmlns:a16="http://schemas.microsoft.com/office/drawing/2014/main" xmlns="" id="{35A0EAB9-4039-6448-AC03-B60DE38901D0}"/>
+                  <a16:creationId xmlns="" xmlns:a16="http://schemas.microsoft.com/office/drawing/2014/main" id="{35A0EAB9-4039-6448-AC03-B60DE38901D0}"/>
                 </a:ext>
               </a:extLst>
             </p:cNvPr>
@@ -16022,8 +16011,8 @@
           </p:nvSpPr>
           <p:spPr>
             <a:xfrm>
-              <a:off x="1780031" y="1583287"/>
-              <a:ext cx="1984637" cy="2956004"/>
+              <a:off x="1780031" y="1583286"/>
+              <a:ext cx="1984637" cy="3395841"/>
             </a:xfrm>
             <a:prstGeom prst="rect">
               <a:avLst/>
@@ -16069,7 +16058,7 @@
             <p:cNvPr id="51" name="Rechteck 50">
               <a:extLst>
                 <a:ext uri="{FF2B5EF4-FFF2-40B4-BE49-F238E27FC236}">
-                  <a16:creationId xmlns:a16="http://schemas.microsoft.com/office/drawing/2014/main" xmlns="" id="{FCCEA108-686B-BB4F-95FB-4BCE5EB529F1}"/>
+                  <a16:creationId xmlns="" xmlns:a16="http://schemas.microsoft.com/office/drawing/2014/main" id="{FCCEA108-686B-BB4F-95FB-4BCE5EB529F1}"/>
                 </a:ext>
               </a:extLst>
             </p:cNvPr>
@@ -16136,8 +16125,8 @@
         </p:nvSpPr>
         <p:spPr>
           <a:xfrm>
-            <a:off x="9632899" y="1766392"/>
-            <a:ext cx="1548459" cy="567160"/>
+            <a:off x="9566891" y="1791256"/>
+            <a:ext cx="1614467" cy="567160"/>
           </a:xfrm>
           <a:prstGeom prst="rect">
             <a:avLst/>
@@ -16196,8 +16185,8 @@
         </p:nvSpPr>
         <p:spPr>
           <a:xfrm>
-            <a:off x="9632899" y="2646511"/>
-            <a:ext cx="1548459" cy="567160"/>
+            <a:off x="9566891" y="3106778"/>
+            <a:ext cx="1614467" cy="567160"/>
           </a:xfrm>
           <a:prstGeom prst="rect">
             <a:avLst/>
@@ -16256,8 +16245,8 @@
         </p:nvSpPr>
         <p:spPr>
           <a:xfrm>
-            <a:off x="9618356" y="3579460"/>
-            <a:ext cx="1548459" cy="567160"/>
+            <a:off x="9566892" y="4024217"/>
+            <a:ext cx="1614466" cy="567160"/>
           </a:xfrm>
           <a:prstGeom prst="rect">
             <a:avLst/>
@@ -16308,61 +16297,126 @@
           </a:p>
         </p:txBody>
       </p:sp>
-      <p:sp>
-        <p:nvSpPr>
-          <p:cNvPr id="3" name="Rechteck 2"/>
-          <p:cNvSpPr/>
+      <p:cxnSp>
+        <p:nvCxnSpPr>
+          <p:cNvPr id="46" name="Gerade Verbindung mit Pfeil 45"/>
+          <p:cNvCxnSpPr>
+            <a:stCxn id="58" idx="2"/>
+            <a:endCxn id="59" idx="0"/>
+          </p:cNvCxnSpPr>
           <p:nvPr/>
-        </p:nvSpPr>
+        </p:nvCxnSpPr>
         <p:spPr>
           <a:xfrm>
-            <a:off x="489962" y="1930878"/>
-            <a:ext cx="914400" cy="265947"/>
+            <a:off x="10374125" y="2358416"/>
+            <a:ext cx="0" cy="748362"/>
           </a:xfrm>
-          <a:prstGeom prst="rect">
+          <a:prstGeom prst="straightConnector1">
             <a:avLst/>
           </a:prstGeom>
-          <a:solidFill>
-            <a:schemeClr val="bg1"/>
-          </a:solidFill>
+          <a:ln>
+            <a:solidFill>
+              <a:schemeClr val="accent6"/>
+            </a:solidFill>
+            <a:tailEnd type="triangle"/>
+          </a:ln>
         </p:spPr>
         <p:style>
-          <a:lnRef idx="2">
-            <a:schemeClr val="accent1">
-              <a:shade val="50000"/>
-            </a:schemeClr>
+          <a:lnRef idx="1">
+            <a:schemeClr val="accent1"/>
           </a:lnRef>
-          <a:fillRef idx="1">
+          <a:fillRef idx="0">
             <a:schemeClr val="accent1"/>
           </a:fillRef>
           <a:effectRef idx="0">
             <a:schemeClr val="accent1"/>
           </a:effectRef>
           <a:fontRef idx="minor">
-            <a:schemeClr val="lt1"/>
+            <a:schemeClr val="tx1"/>
           </a:fontRef>
         </p:style>
-        <p:txBody>
-          <a:bodyPr rtlCol="0" anchor="ctr"/>
-          <a:lstStyle/>
-          <a:p>
-            <a:pPr algn="ctr"/>
-            <a:r>
-              <a:rPr lang="de-DE" b="1" dirty="0" smtClean="0">
-                <a:solidFill>
-                  <a:schemeClr val="accent6"/>
-                </a:solidFill>
-              </a:rPr>
-              <a:t>PFE</a:t>
-            </a:r>
-            <a:endParaRPr lang="de-DE" b="1" dirty="0">
-              <a:solidFill>
-                <a:schemeClr val="accent6"/>
-              </a:solidFill>
-            </a:endParaRPr>
-          </a:p>
-        </p:txBody>
-      </p:sp>
+      </p:cxnSp>
+      <p:cxnSp>
+        <p:nvCxnSpPr>
+          <p:cNvPr id="52" name="Gerade Verbindung mit Pfeil 51"/>
+          <p:cNvCxnSpPr>
+            <a:stCxn id="59" idx="2"/>
+            <a:endCxn id="60" idx="0"/>
+          </p:cNvCxnSpPr>
+          <p:nvPr/>
+        </p:nvCxnSpPr>
+        <p:spPr>
+          <a:xfrm>
+            <a:off x="10374125" y="3673938"/>
+            <a:ext cx="0" cy="350279"/>
+          </a:xfrm>
+          <a:prstGeom prst="straightConnector1">
+            <a:avLst/>
+          </a:prstGeom>
+          <a:ln>
+            <a:solidFill>
+              <a:schemeClr val="accent6"/>
+            </a:solidFill>
+            <a:tailEnd type="triangle"/>
+          </a:ln>
+        </p:spPr>
+        <p:style>
+          <a:lnRef idx="1">
+            <a:schemeClr val="accent1"/>
+          </a:lnRef>
+          <a:fillRef idx="0">
+            <a:schemeClr val="accent1"/>
+          </a:fillRef>
+          <a:effectRef idx="0">
+            <a:schemeClr val="accent1"/>
+          </a:effectRef>
+          <a:fontRef idx="minor">
+            <a:schemeClr val="tx1"/>
+          </a:fontRef>
+        </p:style>
+      </p:cxnSp>
+      <p:cxnSp>
+        <p:nvCxnSpPr>
+          <p:cNvPr id="53" name="Gewinkelte Verbindung 52"/>
+          <p:cNvCxnSpPr>
+            <a:stCxn id="20" idx="2"/>
+            <a:endCxn id="58" idx="1"/>
+          </p:cNvCxnSpPr>
+          <p:nvPr/>
+        </p:nvCxnSpPr>
+        <p:spPr>
+          <a:xfrm rot="5400000" flipH="1" flipV="1">
+            <a:off x="6980743" y="2002346"/>
+            <a:ext cx="2513658" cy="2658638"/>
+          </a:xfrm>
+          <a:prstGeom prst="bentConnector4">
+            <a:avLst>
+              <a:gd name="adj1" fmla="val -23830"/>
+              <a:gd name="adj2" fmla="val 79914"/>
+            </a:avLst>
+          </a:prstGeom>
+          <a:ln w="9525">
+            <a:solidFill>
+              <a:schemeClr val="tx2"/>
+            </a:solidFill>
+            <a:tailEnd type="triangle"/>
+          </a:ln>
+        </p:spPr>
+        <p:style>
+          <a:lnRef idx="1">
+            <a:schemeClr val="accent1"/>
+          </a:lnRef>
+          <a:fillRef idx="0">
+            <a:schemeClr val="accent1"/>
+          </a:fillRef>
+          <a:effectRef idx="0">
+            <a:schemeClr val="accent1"/>
+          </a:effectRef>
+          <a:fontRef idx="minor">
+            <a:schemeClr val="tx1"/>
+          </a:fontRef>
+        </p:style>
+      </p:cxnSp>
     </p:spTree>
     <p:extLst>
       <p:ext uri="{BB962C8B-B14F-4D97-AF65-F5344CB8AC3E}">
@@ -16495,6 +16549,61 @@
               <a:t>Wie kann man komplexe Zusammenhänge sinnvoll aufbereiten?</a:t>
             </a:r>
             <a:endParaRPr lang="de-DE" dirty="0"/>
+          </a:p>
+        </p:txBody>
+      </p:sp>
+      <p:sp>
+        <p:nvSpPr>
+          <p:cNvPr id="4" name="Rechteck 3"/>
+          <p:cNvSpPr/>
+          <p:nvPr/>
+        </p:nvSpPr>
+        <p:spPr>
+          <a:xfrm>
+            <a:off x="8661688" y="5021318"/>
+            <a:ext cx="914400" cy="265947"/>
+          </a:xfrm>
+          <a:prstGeom prst="rect">
+            <a:avLst/>
+          </a:prstGeom>
+          <a:solidFill>
+            <a:schemeClr val="bg1"/>
+          </a:solidFill>
+        </p:spPr>
+        <p:style>
+          <a:lnRef idx="2">
+            <a:schemeClr val="accent1">
+              <a:shade val="50000"/>
+            </a:schemeClr>
+          </a:lnRef>
+          <a:fillRef idx="1">
+            <a:schemeClr val="accent1"/>
+          </a:fillRef>
+          <a:effectRef idx="0">
+            <a:schemeClr val="accent1"/>
+          </a:effectRef>
+          <a:fontRef idx="minor">
+            <a:schemeClr val="lt1"/>
+          </a:fontRef>
+        </p:style>
+        <p:txBody>
+          <a:bodyPr rtlCol="0" anchor="ctr"/>
+          <a:lstStyle/>
+          <a:p>
+            <a:pPr algn="ctr"/>
+            <a:r>
+              <a:rPr lang="de-DE" b="1" dirty="0" smtClean="0">
+                <a:solidFill>
+                  <a:schemeClr val="accent6"/>
+                </a:solidFill>
+              </a:rPr>
+              <a:t>PFE</a:t>
+            </a:r>
+            <a:endParaRPr lang="de-DE" b="1" dirty="0">
+              <a:solidFill>
+                <a:schemeClr val="accent6"/>
+              </a:solidFill>
+            </a:endParaRPr>
           </a:p>
         </p:txBody>
       </p:sp>
@@ -16578,7 +16687,7 @@
           <p:cNvPr id="9" name="Gruppieren 8">
             <a:extLst>
               <a:ext uri="{FF2B5EF4-FFF2-40B4-BE49-F238E27FC236}">
-                <a16:creationId xmlns:a16="http://schemas.microsoft.com/office/drawing/2014/main" xmlns="" id="{64401E1E-557D-5D4F-AE09-187A0802411B}"/>
+                <a16:creationId xmlns="" xmlns:a16="http://schemas.microsoft.com/office/drawing/2014/main" id="{64401E1E-557D-5D4F-AE09-187A0802411B}"/>
               </a:ext>
             </a:extLst>
           </p:cNvPr>
@@ -16598,7 +16707,7 @@
             <p:cNvPr id="10" name="Rechteck 9">
               <a:extLst>
                 <a:ext uri="{FF2B5EF4-FFF2-40B4-BE49-F238E27FC236}">
-                  <a16:creationId xmlns:a16="http://schemas.microsoft.com/office/drawing/2014/main" xmlns="" id="{35A0EAB9-4039-6448-AC03-B60DE38901D0}"/>
+                  <a16:creationId xmlns="" xmlns:a16="http://schemas.microsoft.com/office/drawing/2014/main" id="{35A0EAB9-4039-6448-AC03-B60DE38901D0}"/>
                 </a:ext>
               </a:extLst>
             </p:cNvPr>
@@ -16787,7 +16896,7 @@
             <p:cNvPr id="11" name="Rechteck 10">
               <a:extLst>
                 <a:ext uri="{FF2B5EF4-FFF2-40B4-BE49-F238E27FC236}">
-                  <a16:creationId xmlns:a16="http://schemas.microsoft.com/office/drawing/2014/main" xmlns="" id="{FCCEA108-686B-BB4F-95FB-4BCE5EB529F1}"/>
+                  <a16:creationId xmlns="" xmlns:a16="http://schemas.microsoft.com/office/drawing/2014/main" id="{FCCEA108-686B-BB4F-95FB-4BCE5EB529F1}"/>
                 </a:ext>
               </a:extLst>
             </p:cNvPr>
@@ -16851,7 +16960,7 @@
           <p:cNvPr id="12" name="Gruppieren 11">
             <a:extLst>
               <a:ext uri="{FF2B5EF4-FFF2-40B4-BE49-F238E27FC236}">
-                <a16:creationId xmlns:a16="http://schemas.microsoft.com/office/drawing/2014/main" xmlns="" id="{64401E1E-557D-5D4F-AE09-187A0802411B}"/>
+                <a16:creationId xmlns="" xmlns:a16="http://schemas.microsoft.com/office/drawing/2014/main" id="{64401E1E-557D-5D4F-AE09-187A0802411B}"/>
               </a:ext>
             </a:extLst>
           </p:cNvPr>
@@ -16871,7 +16980,7 @@
             <p:cNvPr id="13" name="Rechteck 12">
               <a:extLst>
                 <a:ext uri="{FF2B5EF4-FFF2-40B4-BE49-F238E27FC236}">
-                  <a16:creationId xmlns:a16="http://schemas.microsoft.com/office/drawing/2014/main" xmlns="" id="{35A0EAB9-4039-6448-AC03-B60DE38901D0}"/>
+                  <a16:creationId xmlns="" xmlns:a16="http://schemas.microsoft.com/office/drawing/2014/main" id="{35A0EAB9-4039-6448-AC03-B60DE38901D0}"/>
                 </a:ext>
               </a:extLst>
             </p:cNvPr>
@@ -17075,7 +17184,7 @@
             <p:cNvPr id="14" name="Rechteck 13">
               <a:extLst>
                 <a:ext uri="{FF2B5EF4-FFF2-40B4-BE49-F238E27FC236}">
-                  <a16:creationId xmlns:a16="http://schemas.microsoft.com/office/drawing/2014/main" xmlns="" id="{FCCEA108-686B-BB4F-95FB-4BCE5EB529F1}"/>
+                  <a16:creationId xmlns="" xmlns:a16="http://schemas.microsoft.com/office/drawing/2014/main" id="{FCCEA108-686B-BB4F-95FB-4BCE5EB529F1}"/>
                 </a:ext>
               </a:extLst>
             </p:cNvPr>
@@ -17200,7 +17309,7 @@
           <p:cNvPr id="7" name="Gruppieren 6">
             <a:extLst>
               <a:ext uri="{FF2B5EF4-FFF2-40B4-BE49-F238E27FC236}">
-                <a16:creationId xmlns:a16="http://schemas.microsoft.com/office/drawing/2014/main" xmlns="" id="{83607870-557A-164A-B22B-C1B49B36656C}"/>
+                <a16:creationId xmlns="" xmlns:a16="http://schemas.microsoft.com/office/drawing/2014/main" id="{83607870-557A-164A-B22B-C1B49B36656C}"/>
               </a:ext>
             </a:extLst>
           </p:cNvPr>
@@ -17220,7 +17329,7 @@
             <p:cNvPr id="8" name="Rechteck 7">
               <a:extLst>
                 <a:ext uri="{FF2B5EF4-FFF2-40B4-BE49-F238E27FC236}">
-                  <a16:creationId xmlns:a16="http://schemas.microsoft.com/office/drawing/2014/main" xmlns="" id="{F1E1E402-969D-194B-AB76-85BAC6C71034}"/>
+                  <a16:creationId xmlns="" xmlns:a16="http://schemas.microsoft.com/office/drawing/2014/main" id="{F1E1E402-969D-194B-AB76-85BAC6C71034}"/>
                 </a:ext>
               </a:extLst>
             </p:cNvPr>
@@ -17304,7 +17413,7 @@
             <p:cNvPr id="9" name="Rechteck 8">
               <a:extLst>
                 <a:ext uri="{FF2B5EF4-FFF2-40B4-BE49-F238E27FC236}">
-                  <a16:creationId xmlns:a16="http://schemas.microsoft.com/office/drawing/2014/main" xmlns="" id="{833772DE-177D-6242-B2B7-89D46A2C0D15}"/>
+                  <a16:creationId xmlns="" xmlns:a16="http://schemas.microsoft.com/office/drawing/2014/main" id="{833772DE-177D-6242-B2B7-89D46A2C0D15}"/>
                 </a:ext>
               </a:extLst>
             </p:cNvPr>
@@ -17395,7 +17504,7 @@
           <p:cNvPr id="11" name="Gruppieren 10">
             <a:extLst>
               <a:ext uri="{FF2B5EF4-FFF2-40B4-BE49-F238E27FC236}">
-                <a16:creationId xmlns:a16="http://schemas.microsoft.com/office/drawing/2014/main" xmlns="" id="{00DD676A-B61C-5D48-BC56-AC4BB52F8528}"/>
+                <a16:creationId xmlns="" xmlns:a16="http://schemas.microsoft.com/office/drawing/2014/main" id="{00DD676A-B61C-5D48-BC56-AC4BB52F8528}"/>
               </a:ext>
             </a:extLst>
           </p:cNvPr>
@@ -17415,7 +17524,7 @@
             <p:cNvPr id="12" name="Rechteck 11">
               <a:extLst>
                 <a:ext uri="{FF2B5EF4-FFF2-40B4-BE49-F238E27FC236}">
-                  <a16:creationId xmlns:a16="http://schemas.microsoft.com/office/drawing/2014/main" xmlns="" id="{201F63B0-4CCA-B640-BD88-BAB407BC2183}"/>
+                  <a16:creationId xmlns="" xmlns:a16="http://schemas.microsoft.com/office/drawing/2014/main" id="{201F63B0-4CCA-B640-BD88-BAB407BC2183}"/>
                 </a:ext>
               </a:extLst>
             </p:cNvPr>
@@ -17499,7 +17608,7 @@
             <p:cNvPr id="13" name="Rechteck 12">
               <a:extLst>
                 <a:ext uri="{FF2B5EF4-FFF2-40B4-BE49-F238E27FC236}">
-                  <a16:creationId xmlns:a16="http://schemas.microsoft.com/office/drawing/2014/main" xmlns="" id="{514C32A1-04E5-494D-AB34-069455276B16}"/>
+                  <a16:creationId xmlns="" xmlns:a16="http://schemas.microsoft.com/office/drawing/2014/main" id="{514C32A1-04E5-494D-AB34-069455276B16}"/>
                 </a:ext>
               </a:extLst>
             </p:cNvPr>
@@ -17566,7 +17675,7 @@
           <p:cNvPr id="14" name="Gruppieren 13">
             <a:extLst>
               <a:ext uri="{FF2B5EF4-FFF2-40B4-BE49-F238E27FC236}">
-                <a16:creationId xmlns:a16="http://schemas.microsoft.com/office/drawing/2014/main" xmlns="" id="{C0CAAA13-C09D-AC4E-991C-1FEB2957F9A9}"/>
+                <a16:creationId xmlns="" xmlns:a16="http://schemas.microsoft.com/office/drawing/2014/main" id="{C0CAAA13-C09D-AC4E-991C-1FEB2957F9A9}"/>
               </a:ext>
             </a:extLst>
           </p:cNvPr>
@@ -17586,7 +17695,7 @@
             <p:cNvPr id="15" name="Rechteck 14">
               <a:extLst>
                 <a:ext uri="{FF2B5EF4-FFF2-40B4-BE49-F238E27FC236}">
-                  <a16:creationId xmlns:a16="http://schemas.microsoft.com/office/drawing/2014/main" xmlns="" id="{71B66402-AE28-034E-B538-DD8098A05FCC}"/>
+                  <a16:creationId xmlns="" xmlns:a16="http://schemas.microsoft.com/office/drawing/2014/main" id="{71B66402-AE28-034E-B538-DD8098A05FCC}"/>
                 </a:ext>
               </a:extLst>
             </p:cNvPr>
@@ -17725,7 +17834,7 @@
             <p:cNvPr id="16" name="Rechteck 15">
               <a:extLst>
                 <a:ext uri="{FF2B5EF4-FFF2-40B4-BE49-F238E27FC236}">
-                  <a16:creationId xmlns:a16="http://schemas.microsoft.com/office/drawing/2014/main" xmlns="" id="{3BF267A1-CAB7-CF4A-B6F4-D9891842B9EE}"/>
+                  <a16:creationId xmlns="" xmlns:a16="http://schemas.microsoft.com/office/drawing/2014/main" id="{3BF267A1-CAB7-CF4A-B6F4-D9891842B9EE}"/>
                 </a:ext>
               </a:extLst>
             </p:cNvPr>
@@ -17784,7 +17893,7 @@
           <p:cNvPr id="20" name="Gewinkelte Verbindung 19">
             <a:extLst>
               <a:ext uri="{FF2B5EF4-FFF2-40B4-BE49-F238E27FC236}">
-                <a16:creationId xmlns:a16="http://schemas.microsoft.com/office/drawing/2014/main" xmlns="" id="{FD336F23-DB98-1342-BB4F-5D218AF61D6F}"/>
+                <a16:creationId xmlns="" xmlns:a16="http://schemas.microsoft.com/office/drawing/2014/main" id="{FD336F23-DB98-1342-BB4F-5D218AF61D6F}"/>
               </a:ext>
             </a:extLst>
           </p:cNvPr>
@@ -17835,7 +17944,7 @@
           <p:cNvPr id="22" name="Gewinkelte Verbindung 21">
             <a:extLst>
               <a:ext uri="{FF2B5EF4-FFF2-40B4-BE49-F238E27FC236}">
-                <a16:creationId xmlns:a16="http://schemas.microsoft.com/office/drawing/2014/main" xmlns="" id="{BBE684D5-0A18-BA4A-8AA1-7553DDC193B9}"/>
+                <a16:creationId xmlns="" xmlns:a16="http://schemas.microsoft.com/office/drawing/2014/main" id="{BBE684D5-0A18-BA4A-8AA1-7553DDC193B9}"/>
               </a:ext>
             </a:extLst>
           </p:cNvPr>

</xml_diff>